<commit_message>
A much better version
</commit_message>
<xml_diff>
--- a/doc/diagram.pptx
+++ b/doc/diagram.pptx
@@ -199,7 +199,7 @@
           <a:p>
             <a:fld id="{5CF8B8E6-11F7-0C4E-B8DD-804237B9B63E}" type="datetimeFigureOut">
               <a:rPr lang="en-US" smtClean="0"/>
-              <a:t>1/24/18</a:t>
+              <a:t>1/25/18</a:t>
             </a:fld>
             <a:endParaRPr lang="en-US"/>
           </a:p>
@@ -866,7 +866,7 @@
           <a:p>
             <a:fld id="{05A3AB3E-77AE-884C-91B8-8D717975D1C6}" type="datetimeFigureOut">
               <a:rPr lang="en-US" smtClean="0"/>
-              <a:t>1/24/18</a:t>
+              <a:t>1/25/18</a:t>
             </a:fld>
             <a:endParaRPr lang="en-US"/>
           </a:p>
@@ -1036,7 +1036,7 @@
           <a:p>
             <a:fld id="{05A3AB3E-77AE-884C-91B8-8D717975D1C6}" type="datetimeFigureOut">
               <a:rPr lang="en-US" smtClean="0"/>
-              <a:t>1/24/18</a:t>
+              <a:t>1/25/18</a:t>
             </a:fld>
             <a:endParaRPr lang="en-US"/>
           </a:p>
@@ -1216,7 +1216,7 @@
           <a:p>
             <a:fld id="{05A3AB3E-77AE-884C-91B8-8D717975D1C6}" type="datetimeFigureOut">
               <a:rPr lang="en-US" smtClean="0"/>
-              <a:t>1/24/18</a:t>
+              <a:t>1/25/18</a:t>
             </a:fld>
             <a:endParaRPr lang="en-US"/>
           </a:p>
@@ -1386,7 +1386,7 @@
           <a:p>
             <a:fld id="{05A3AB3E-77AE-884C-91B8-8D717975D1C6}" type="datetimeFigureOut">
               <a:rPr lang="en-US" smtClean="0"/>
-              <a:t>1/24/18</a:t>
+              <a:t>1/25/18</a:t>
             </a:fld>
             <a:endParaRPr lang="en-US"/>
           </a:p>
@@ -1632,7 +1632,7 @@
           <a:p>
             <a:fld id="{05A3AB3E-77AE-884C-91B8-8D717975D1C6}" type="datetimeFigureOut">
               <a:rPr lang="en-US" smtClean="0"/>
-              <a:t>1/24/18</a:t>
+              <a:t>1/25/18</a:t>
             </a:fld>
             <a:endParaRPr lang="en-US"/>
           </a:p>
@@ -1864,7 +1864,7 @@
           <a:p>
             <a:fld id="{05A3AB3E-77AE-884C-91B8-8D717975D1C6}" type="datetimeFigureOut">
               <a:rPr lang="en-US" smtClean="0"/>
-              <a:t>1/24/18</a:t>
+              <a:t>1/25/18</a:t>
             </a:fld>
             <a:endParaRPr lang="en-US"/>
           </a:p>
@@ -2231,7 +2231,7 @@
           <a:p>
             <a:fld id="{05A3AB3E-77AE-884C-91B8-8D717975D1C6}" type="datetimeFigureOut">
               <a:rPr lang="en-US" smtClean="0"/>
-              <a:t>1/24/18</a:t>
+              <a:t>1/25/18</a:t>
             </a:fld>
             <a:endParaRPr lang="en-US"/>
           </a:p>
@@ -2349,7 +2349,7 @@
           <a:p>
             <a:fld id="{05A3AB3E-77AE-884C-91B8-8D717975D1C6}" type="datetimeFigureOut">
               <a:rPr lang="en-US" smtClean="0"/>
-              <a:t>1/24/18</a:t>
+              <a:t>1/25/18</a:t>
             </a:fld>
             <a:endParaRPr lang="en-US"/>
           </a:p>
@@ -2444,7 +2444,7 @@
           <a:p>
             <a:fld id="{05A3AB3E-77AE-884C-91B8-8D717975D1C6}" type="datetimeFigureOut">
               <a:rPr lang="en-US" smtClean="0"/>
-              <a:t>1/24/18</a:t>
+              <a:t>1/25/18</a:t>
             </a:fld>
             <a:endParaRPr lang="en-US"/>
           </a:p>
@@ -2721,7 +2721,7 @@
           <a:p>
             <a:fld id="{05A3AB3E-77AE-884C-91B8-8D717975D1C6}" type="datetimeFigureOut">
               <a:rPr lang="en-US" smtClean="0"/>
-              <a:t>1/24/18</a:t>
+              <a:t>1/25/18</a:t>
             </a:fld>
             <a:endParaRPr lang="en-US"/>
           </a:p>
@@ -2974,7 +2974,7 @@
           <a:p>
             <a:fld id="{05A3AB3E-77AE-884C-91B8-8D717975D1C6}" type="datetimeFigureOut">
               <a:rPr lang="en-US" smtClean="0"/>
-              <a:t>1/24/18</a:t>
+              <a:t>1/25/18</a:t>
             </a:fld>
             <a:endParaRPr lang="en-US"/>
           </a:p>
@@ -3187,7 +3187,7 @@
           <a:p>
             <a:fld id="{05A3AB3E-77AE-884C-91B8-8D717975D1C6}" type="datetimeFigureOut">
               <a:rPr lang="en-US" smtClean="0"/>
-              <a:t>1/24/18</a:t>
+              <a:t>1/25/18</a:t>
             </a:fld>
             <a:endParaRPr lang="en-US"/>
           </a:p>
@@ -6326,7 +6326,7 @@
         <p:spPr>
           <a:xfrm>
             <a:off x="1816925" y="914399"/>
-            <a:ext cx="3063833" cy="3716977"/>
+            <a:ext cx="3063833" cy="5096934"/>
           </a:xfrm>
           <a:prstGeom prst="rect">
             <a:avLst/>
@@ -6372,7 +6372,7 @@
         </p:nvSpPr>
         <p:spPr>
           <a:xfrm>
-            <a:off x="1816925" y="1921823"/>
+            <a:off x="1816924" y="2443895"/>
             <a:ext cx="3063833" cy="807522"/>
           </a:xfrm>
           <a:prstGeom prst="rect">
@@ -6416,7 +6416,7 @@
         </p:nvSpPr>
         <p:spPr>
           <a:xfrm>
-            <a:off x="1816925" y="2929246"/>
+            <a:off x="1816924" y="5203811"/>
             <a:ext cx="3063833" cy="807522"/>
           </a:xfrm>
           <a:prstGeom prst="rect">
@@ -6477,6 +6477,126 @@
             <a:r>
               <a:rPr lang="en-US" sz="2400" dirty="0" smtClean="0"/>
               <a:t>Title</a:t>
+            </a:r>
+            <a:endParaRPr lang="en-US" sz="2400" dirty="0"/>
+          </a:p>
+        </p:txBody>
+      </p:sp>
+      <p:sp>
+        <p:nvSpPr>
+          <p:cNvPr id="3" name="Oval 2"/>
+          <p:cNvSpPr/>
+          <p:nvPr/>
+        </p:nvSpPr>
+        <p:spPr>
+          <a:xfrm>
+            <a:off x="4386203" y="1506660"/>
+            <a:ext cx="360000" cy="360000"/>
+          </a:xfrm>
+          <a:prstGeom prst="ellipse">
+            <a:avLst/>
+          </a:prstGeom>
+          <a:solidFill>
+            <a:srgbClr val="FF0000"/>
+          </a:solidFill>
+          <a:ln>
+            <a:noFill/>
+          </a:ln>
+        </p:spPr>
+        <p:style>
+          <a:lnRef idx="2">
+            <a:schemeClr val="accent1">
+              <a:shade val="50000"/>
+            </a:schemeClr>
+          </a:lnRef>
+          <a:fillRef idx="1">
+            <a:schemeClr val="accent1"/>
+          </a:fillRef>
+          <a:effectRef idx="0">
+            <a:schemeClr val="accent1"/>
+          </a:effectRef>
+          <a:fontRef idx="minor">
+            <a:schemeClr val="lt1"/>
+          </a:fontRef>
+        </p:style>
+        <p:txBody>
+          <a:bodyPr rtlCol="0" anchor="ctr"/>
+          <a:lstStyle/>
+          <a:p>
+            <a:pPr algn="ctr"/>
+            <a:endParaRPr lang="en-US"/>
+          </a:p>
+        </p:txBody>
+      </p:sp>
+      <p:sp>
+        <p:nvSpPr>
+          <p:cNvPr id="7" name="TextBox 6"/>
+          <p:cNvSpPr txBox="1"/>
+          <p:nvPr/>
+        </p:nvSpPr>
+        <p:spPr>
+          <a:xfrm>
+            <a:off x="4971647" y="1455827"/>
+            <a:ext cx="2150534" cy="461665"/>
+          </a:xfrm>
+          <a:prstGeom prst="rect">
+            <a:avLst/>
+          </a:prstGeom>
+          <a:noFill/>
+        </p:spPr>
+        <p:txBody>
+          <a:bodyPr wrap="square" rtlCol="0">
+            <a:spAutoFit/>
+          </a:bodyPr>
+          <a:lstStyle/>
+          <a:p>
+            <a:r>
+              <a:rPr lang="en-US" sz="2400" dirty="0" smtClean="0"/>
+              <a:t>Delete Button</a:t>
+            </a:r>
+            <a:endParaRPr lang="en-US" sz="2400" dirty="0"/>
+          </a:p>
+        </p:txBody>
+      </p:sp>
+      <p:sp>
+        <p:nvSpPr>
+          <p:cNvPr id="8" name="Rectangle 7"/>
+          <p:cNvSpPr/>
+          <p:nvPr/>
+        </p:nvSpPr>
+        <p:spPr>
+          <a:xfrm>
+            <a:off x="1816924" y="3823853"/>
+            <a:ext cx="3063833" cy="807522"/>
+          </a:xfrm>
+          <a:prstGeom prst="rect">
+            <a:avLst/>
+          </a:prstGeom>
+        </p:spPr>
+        <p:style>
+          <a:lnRef idx="2">
+            <a:schemeClr val="accent1">
+              <a:shade val="50000"/>
+            </a:schemeClr>
+          </a:lnRef>
+          <a:fillRef idx="1">
+            <a:schemeClr val="accent1"/>
+          </a:fillRef>
+          <a:effectRef idx="0">
+            <a:schemeClr val="accent1"/>
+          </a:effectRef>
+          <a:fontRef idx="minor">
+            <a:schemeClr val="lt1"/>
+          </a:fontRef>
+        </p:style>
+        <p:txBody>
+          <a:bodyPr rtlCol="0" anchor="ctr"/>
+          <a:lstStyle/>
+          <a:p>
+            <a:pPr algn="ctr"/>
+            <a:r>
+              <a:rPr lang="en-US" sz="2400" dirty="0" smtClean="0"/>
+              <a:t>Others, e.g., +/- button</a:t>
             </a:r>
             <a:endParaRPr lang="en-US" sz="2400" dirty="0"/>
           </a:p>

</xml_diff>

<commit_message>
Refactor the action node
</commit_message>
<xml_diff>
--- a/doc/diagram.pptx
+++ b/doc/diagram.pptx
@@ -199,7 +199,7 @@
           <a:p>
             <a:fld id="{5CF8B8E6-11F7-0C4E-B8DD-804237B9B63E}" type="datetimeFigureOut">
               <a:rPr lang="en-US" smtClean="0"/>
-              <a:t>1/25/18</a:t>
+              <a:t>1/28/18</a:t>
             </a:fld>
             <a:endParaRPr lang="en-US"/>
           </a:p>
@@ -866,7 +866,7 @@
           <a:p>
             <a:fld id="{05A3AB3E-77AE-884C-91B8-8D717975D1C6}" type="datetimeFigureOut">
               <a:rPr lang="en-US" smtClean="0"/>
-              <a:t>1/25/18</a:t>
+              <a:t>1/28/18</a:t>
             </a:fld>
             <a:endParaRPr lang="en-US"/>
           </a:p>
@@ -1036,7 +1036,7 @@
           <a:p>
             <a:fld id="{05A3AB3E-77AE-884C-91B8-8D717975D1C6}" type="datetimeFigureOut">
               <a:rPr lang="en-US" smtClean="0"/>
-              <a:t>1/25/18</a:t>
+              <a:t>1/28/18</a:t>
             </a:fld>
             <a:endParaRPr lang="en-US"/>
           </a:p>
@@ -1216,7 +1216,7 @@
           <a:p>
             <a:fld id="{05A3AB3E-77AE-884C-91B8-8D717975D1C6}" type="datetimeFigureOut">
               <a:rPr lang="en-US" smtClean="0"/>
-              <a:t>1/25/18</a:t>
+              <a:t>1/28/18</a:t>
             </a:fld>
             <a:endParaRPr lang="en-US"/>
           </a:p>
@@ -1386,7 +1386,7 @@
           <a:p>
             <a:fld id="{05A3AB3E-77AE-884C-91B8-8D717975D1C6}" type="datetimeFigureOut">
               <a:rPr lang="en-US" smtClean="0"/>
-              <a:t>1/25/18</a:t>
+              <a:t>1/28/18</a:t>
             </a:fld>
             <a:endParaRPr lang="en-US"/>
           </a:p>
@@ -1632,7 +1632,7 @@
           <a:p>
             <a:fld id="{05A3AB3E-77AE-884C-91B8-8D717975D1C6}" type="datetimeFigureOut">
               <a:rPr lang="en-US" smtClean="0"/>
-              <a:t>1/25/18</a:t>
+              <a:t>1/28/18</a:t>
             </a:fld>
             <a:endParaRPr lang="en-US"/>
           </a:p>
@@ -1864,7 +1864,7 @@
           <a:p>
             <a:fld id="{05A3AB3E-77AE-884C-91B8-8D717975D1C6}" type="datetimeFigureOut">
               <a:rPr lang="en-US" smtClean="0"/>
-              <a:t>1/25/18</a:t>
+              <a:t>1/28/18</a:t>
             </a:fld>
             <a:endParaRPr lang="en-US"/>
           </a:p>
@@ -2231,7 +2231,7 @@
           <a:p>
             <a:fld id="{05A3AB3E-77AE-884C-91B8-8D717975D1C6}" type="datetimeFigureOut">
               <a:rPr lang="en-US" smtClean="0"/>
-              <a:t>1/25/18</a:t>
+              <a:t>1/28/18</a:t>
             </a:fld>
             <a:endParaRPr lang="en-US"/>
           </a:p>
@@ -2349,7 +2349,7 @@
           <a:p>
             <a:fld id="{05A3AB3E-77AE-884C-91B8-8D717975D1C6}" type="datetimeFigureOut">
               <a:rPr lang="en-US" smtClean="0"/>
-              <a:t>1/25/18</a:t>
+              <a:t>1/28/18</a:t>
             </a:fld>
             <a:endParaRPr lang="en-US"/>
           </a:p>
@@ -2444,7 +2444,7 @@
           <a:p>
             <a:fld id="{05A3AB3E-77AE-884C-91B8-8D717975D1C6}" type="datetimeFigureOut">
               <a:rPr lang="en-US" smtClean="0"/>
-              <a:t>1/25/18</a:t>
+              <a:t>1/28/18</a:t>
             </a:fld>
             <a:endParaRPr lang="en-US"/>
           </a:p>
@@ -2721,7 +2721,7 @@
           <a:p>
             <a:fld id="{05A3AB3E-77AE-884C-91B8-8D717975D1C6}" type="datetimeFigureOut">
               <a:rPr lang="en-US" smtClean="0"/>
-              <a:t>1/25/18</a:t>
+              <a:t>1/28/18</a:t>
             </a:fld>
             <a:endParaRPr lang="en-US"/>
           </a:p>
@@ -2974,7 +2974,7 @@
           <a:p>
             <a:fld id="{05A3AB3E-77AE-884C-91B8-8D717975D1C6}" type="datetimeFigureOut">
               <a:rPr lang="en-US" smtClean="0"/>
-              <a:t>1/25/18</a:t>
+              <a:t>1/28/18</a:t>
             </a:fld>
             <a:endParaRPr lang="en-US"/>
           </a:p>
@@ -3187,7 +3187,7 @@
           <a:p>
             <a:fld id="{05A3AB3E-77AE-884C-91B8-8D717975D1C6}" type="datetimeFigureOut">
               <a:rPr lang="en-US" smtClean="0"/>
-              <a:t>1/25/18</a:t>
+              <a:t>1/28/18</a:t>
             </a:fld>
             <a:endParaRPr lang="en-US"/>
           </a:p>
@@ -6599,6 +6599,70 @@
               <a:t>Others, e.g., +/- button</a:t>
             </a:r>
             <a:endParaRPr lang="en-US" sz="2400" dirty="0"/>
+          </a:p>
+        </p:txBody>
+      </p:sp>
+      <p:sp>
+        <p:nvSpPr>
+          <p:cNvPr id="12" name="TextBox 11"/>
+          <p:cNvSpPr txBox="1"/>
+          <p:nvPr/>
+        </p:nvSpPr>
+        <p:spPr>
+          <a:xfrm>
+            <a:off x="5107834" y="5042118"/>
+            <a:ext cx="4444727" cy="1815882"/>
+          </a:xfrm>
+          <a:prstGeom prst="rect">
+            <a:avLst/>
+          </a:prstGeom>
+          <a:noFill/>
+        </p:spPr>
+        <p:txBody>
+          <a:bodyPr wrap="square" rtlCol="0">
+            <a:spAutoFit/>
+          </a:bodyPr>
+          <a:lstStyle/>
+          <a:p>
+            <a:r>
+              <a:rPr lang="en-US" sz="2000" dirty="0" smtClean="0"/>
+              <a:t>Box</a:t>
+            </a:r>
+            <a:endParaRPr lang="en-US" sz="2000" dirty="0"/>
+          </a:p>
+          <a:p>
+            <a:r>
+              <a:rPr lang="en-US" sz="2000" dirty="0" smtClean="0"/>
+              <a:t>	Text</a:t>
+            </a:r>
+          </a:p>
+          <a:p>
+            <a:r>
+              <a:rPr lang="en-US" sz="2000" dirty="0"/>
+              <a:t>	</a:t>
+            </a:r>
+            <a:r>
+              <a:rPr lang="en-US" sz="2000" dirty="0" smtClean="0"/>
+              <a:t>Number</a:t>
+            </a:r>
+          </a:p>
+          <a:p>
+            <a:r>
+              <a:rPr lang="en-US" sz="2000" dirty="0"/>
+              <a:t>	</a:t>
+            </a:r>
+            <a:r>
+              <a:rPr lang="mr-IN" sz="2000" dirty="0" smtClean="0"/>
+              <a:t>…</a:t>
+            </a:r>
+            <a:endParaRPr lang="en-US" sz="2000" dirty="0" smtClean="0"/>
+          </a:p>
+          <a:p>
+            <a:r>
+              <a:rPr lang="en-US" sz="3200" dirty="0"/>
+              <a:t>	</a:t>
+            </a:r>
+            <a:endParaRPr lang="en-US" sz="3200" dirty="0" smtClean="0"/>
           </a:p>
         </p:txBody>
       </p:sp>

</xml_diff>

<commit_message>
Add BBW finished, but the code is buggy
</commit_message>
<xml_diff>
--- a/doc/diagram.pptx
+++ b/doc/diagram.pptx
@@ -5,12 +5,13 @@
     <p:sldMasterId id="2147483648" r:id="rId1"/>
   </p:sldMasterIdLst>
   <p:notesMasterIdLst>
-    <p:notesMasterId r:id="rId5"/>
+    <p:notesMasterId r:id="rId6"/>
   </p:notesMasterIdLst>
   <p:sldIdLst>
     <p:sldId id="258" r:id="rId2"/>
     <p:sldId id="259" r:id="rId3"/>
     <p:sldId id="260" r:id="rId4"/>
+    <p:sldId id="261" r:id="rId5"/>
   </p:sldIdLst>
   <p:sldSz cx="12192000" cy="6858000"/>
   <p:notesSz cx="6858000" cy="9144000"/>
@@ -199,7 +200,7 @@
           <a:p>
             <a:fld id="{5CF8B8E6-11F7-0C4E-B8DD-804237B9B63E}" type="datetimeFigureOut">
               <a:rPr lang="en-US" smtClean="0"/>
-              <a:t>1/28/18</a:t>
+              <a:t>2/2/18</a:t>
             </a:fld>
             <a:endParaRPr lang="en-US"/>
           </a:p>
@@ -866,7 +867,7 @@
           <a:p>
             <a:fld id="{05A3AB3E-77AE-884C-91B8-8D717975D1C6}" type="datetimeFigureOut">
               <a:rPr lang="en-US" smtClean="0"/>
-              <a:t>1/28/18</a:t>
+              <a:t>2/2/18</a:t>
             </a:fld>
             <a:endParaRPr lang="en-US"/>
           </a:p>
@@ -1036,7 +1037,7 @@
           <a:p>
             <a:fld id="{05A3AB3E-77AE-884C-91B8-8D717975D1C6}" type="datetimeFigureOut">
               <a:rPr lang="en-US" smtClean="0"/>
-              <a:t>1/28/18</a:t>
+              <a:t>2/2/18</a:t>
             </a:fld>
             <a:endParaRPr lang="en-US"/>
           </a:p>
@@ -1216,7 +1217,7 @@
           <a:p>
             <a:fld id="{05A3AB3E-77AE-884C-91B8-8D717975D1C6}" type="datetimeFigureOut">
               <a:rPr lang="en-US" smtClean="0"/>
-              <a:t>1/28/18</a:t>
+              <a:t>2/2/18</a:t>
             </a:fld>
             <a:endParaRPr lang="en-US"/>
           </a:p>
@@ -1386,7 +1387,7 @@
           <a:p>
             <a:fld id="{05A3AB3E-77AE-884C-91B8-8D717975D1C6}" type="datetimeFigureOut">
               <a:rPr lang="en-US" smtClean="0"/>
-              <a:t>1/28/18</a:t>
+              <a:t>2/2/18</a:t>
             </a:fld>
             <a:endParaRPr lang="en-US"/>
           </a:p>
@@ -1632,7 +1633,7 @@
           <a:p>
             <a:fld id="{05A3AB3E-77AE-884C-91B8-8D717975D1C6}" type="datetimeFigureOut">
               <a:rPr lang="en-US" smtClean="0"/>
-              <a:t>1/28/18</a:t>
+              <a:t>2/2/18</a:t>
             </a:fld>
             <a:endParaRPr lang="en-US"/>
           </a:p>
@@ -1864,7 +1865,7 @@
           <a:p>
             <a:fld id="{05A3AB3E-77AE-884C-91B8-8D717975D1C6}" type="datetimeFigureOut">
               <a:rPr lang="en-US" smtClean="0"/>
-              <a:t>1/28/18</a:t>
+              <a:t>2/2/18</a:t>
             </a:fld>
             <a:endParaRPr lang="en-US"/>
           </a:p>
@@ -2231,7 +2232,7 @@
           <a:p>
             <a:fld id="{05A3AB3E-77AE-884C-91B8-8D717975D1C6}" type="datetimeFigureOut">
               <a:rPr lang="en-US" smtClean="0"/>
-              <a:t>1/28/18</a:t>
+              <a:t>2/2/18</a:t>
             </a:fld>
             <a:endParaRPr lang="en-US"/>
           </a:p>
@@ -2349,7 +2350,7 @@
           <a:p>
             <a:fld id="{05A3AB3E-77AE-884C-91B8-8D717975D1C6}" type="datetimeFigureOut">
               <a:rPr lang="en-US" smtClean="0"/>
-              <a:t>1/28/18</a:t>
+              <a:t>2/2/18</a:t>
             </a:fld>
             <a:endParaRPr lang="en-US"/>
           </a:p>
@@ -2444,7 +2445,7 @@
           <a:p>
             <a:fld id="{05A3AB3E-77AE-884C-91B8-8D717975D1C6}" type="datetimeFigureOut">
               <a:rPr lang="en-US" smtClean="0"/>
-              <a:t>1/28/18</a:t>
+              <a:t>2/2/18</a:t>
             </a:fld>
             <a:endParaRPr lang="en-US"/>
           </a:p>
@@ -2721,7 +2722,7 @@
           <a:p>
             <a:fld id="{05A3AB3E-77AE-884C-91B8-8D717975D1C6}" type="datetimeFigureOut">
               <a:rPr lang="en-US" smtClean="0"/>
-              <a:t>1/28/18</a:t>
+              <a:t>2/2/18</a:t>
             </a:fld>
             <a:endParaRPr lang="en-US"/>
           </a:p>
@@ -2974,7 +2975,7 @@
           <a:p>
             <a:fld id="{05A3AB3E-77AE-884C-91B8-8D717975D1C6}" type="datetimeFigureOut">
               <a:rPr lang="en-US" smtClean="0"/>
-              <a:t>1/28/18</a:t>
+              <a:t>2/2/18</a:t>
             </a:fld>
             <a:endParaRPr lang="en-US"/>
           </a:p>
@@ -3187,7 +3188,7 @@
           <a:p>
             <a:fld id="{05A3AB3E-77AE-884C-91B8-8D717975D1C6}" type="datetimeFigureOut">
               <a:rPr lang="en-US" smtClean="0"/>
-              <a:t>1/28/18</a:t>
+              <a:t>2/2/18</a:t>
             </a:fld>
             <a:endParaRPr lang="en-US"/>
           </a:p>
@@ -6670,6 +6671,86 @@
     <p:extLst>
       <p:ext uri="{BB962C8B-B14F-4D97-AF65-F5344CB8AC3E}">
         <p14:creationId xmlns:p14="http://schemas.microsoft.com/office/powerpoint/2010/main" val="1118069069"/>
+      </p:ext>
+    </p:extLst>
+  </p:cSld>
+  <p:clrMapOvr>
+    <a:masterClrMapping/>
+  </p:clrMapOvr>
+</p:sld>
+</file>
+
+<file path=ppt/slides/slide4.xml><?xml version="1.0" encoding="utf-8"?>
+<p:sld xmlns:a="http://schemas.openxmlformats.org/drawingml/2006/main" xmlns:r="http://schemas.openxmlformats.org/officeDocument/2006/relationships" xmlns:p="http://schemas.openxmlformats.org/presentationml/2006/main">
+  <p:cSld>
+    <p:spTree>
+      <p:nvGrpSpPr>
+        <p:cNvPr id="1" name=""/>
+        <p:cNvGrpSpPr/>
+        <p:nvPr/>
+      </p:nvGrpSpPr>
+      <p:grpSpPr>
+        <a:xfrm>
+          <a:off x="0" y="0"/>
+          <a:ext cx="0" cy="0"/>
+          <a:chOff x="0" y="0"/>
+          <a:chExt cx="0" cy="0"/>
+        </a:xfrm>
+      </p:grpSpPr>
+      <p:sp>
+        <p:nvSpPr>
+          <p:cNvPr id="2" name="Title 1"/>
+          <p:cNvSpPr>
+            <a:spLocks noGrp="1"/>
+          </p:cNvSpPr>
+          <p:nvPr>
+            <p:ph type="title"/>
+          </p:nvPr>
+        </p:nvSpPr>
+        <p:spPr/>
+        <p:txBody>
+          <a:bodyPr/>
+          <a:lstStyle/>
+          <a:p>
+            <a:r>
+              <a:rPr lang="en-US" dirty="0" smtClean="0"/>
+              <a:t>BBW</a:t>
+            </a:r>
+            <a:endParaRPr lang="en-US" dirty="0"/>
+          </a:p>
+        </p:txBody>
+      </p:sp>
+      <p:sp>
+        <p:nvSpPr>
+          <p:cNvPr id="3" name="Content Placeholder 2"/>
+          <p:cNvSpPr>
+            <a:spLocks noGrp="1"/>
+          </p:cNvSpPr>
+          <p:nvPr>
+            <p:ph idx="1"/>
+          </p:nvPr>
+        </p:nvSpPr>
+        <p:spPr/>
+        <p:txBody>
+          <a:bodyPr/>
+          <a:lstStyle/>
+          <a:p>
+            <a:r>
+              <a:rPr lang="en-US" dirty="0" smtClean="0"/>
+              <a:t>Mainly in </a:t>
+            </a:r>
+            <a:r>
+              <a:rPr lang="en-US" smtClean="0"/>
+              <a:t>Viewport.js</a:t>
+            </a:r>
+            <a:endParaRPr lang="en-US"/>
+          </a:p>
+        </p:txBody>
+      </p:sp>
+    </p:spTree>
+    <p:extLst>
+      <p:ext uri="{BB962C8B-B14F-4D97-AF65-F5344CB8AC3E}">
+        <p14:creationId xmlns:p14="http://schemas.microsoft.com/office/powerpoint/2010/main" val="342686362"/>
       </p:ext>
     </p:extLst>
   </p:cSld>

</xml_diff>

<commit_message>
Buggy particle filter tracking, stay tuned
</commit_message>
<xml_diff>
--- a/doc/diagram.pptx
+++ b/doc/diagram.pptx
@@ -5,13 +5,14 @@
     <p:sldMasterId id="2147483648" r:id="rId1"/>
   </p:sldMasterIdLst>
   <p:notesMasterIdLst>
-    <p:notesMasterId r:id="rId6"/>
+    <p:notesMasterId r:id="rId7"/>
   </p:notesMasterIdLst>
   <p:sldIdLst>
     <p:sldId id="258" r:id="rId2"/>
     <p:sldId id="259" r:id="rId3"/>
     <p:sldId id="260" r:id="rId4"/>
     <p:sldId id="261" r:id="rId5"/>
+    <p:sldId id="262" r:id="rId6"/>
   </p:sldIdLst>
   <p:sldSz cx="12192000" cy="6858000"/>
   <p:notesSz cx="6858000" cy="9144000"/>
@@ -200,7 +201,7 @@
           <a:p>
             <a:fld id="{5CF8B8E6-11F7-0C4E-B8DD-804237B9B63E}" type="datetimeFigureOut">
               <a:rPr lang="en-US" smtClean="0"/>
-              <a:t>2/2/18</a:t>
+              <a:t>2/4/18</a:t>
             </a:fld>
             <a:endParaRPr lang="en-US"/>
           </a:p>
@@ -867,7 +868,7 @@
           <a:p>
             <a:fld id="{05A3AB3E-77AE-884C-91B8-8D717975D1C6}" type="datetimeFigureOut">
               <a:rPr lang="en-US" smtClean="0"/>
-              <a:t>2/2/18</a:t>
+              <a:t>2/4/18</a:t>
             </a:fld>
             <a:endParaRPr lang="en-US"/>
           </a:p>
@@ -1037,7 +1038,7 @@
           <a:p>
             <a:fld id="{05A3AB3E-77AE-884C-91B8-8D717975D1C6}" type="datetimeFigureOut">
               <a:rPr lang="en-US" smtClean="0"/>
-              <a:t>2/2/18</a:t>
+              <a:t>2/4/18</a:t>
             </a:fld>
             <a:endParaRPr lang="en-US"/>
           </a:p>
@@ -1217,7 +1218,7 @@
           <a:p>
             <a:fld id="{05A3AB3E-77AE-884C-91B8-8D717975D1C6}" type="datetimeFigureOut">
               <a:rPr lang="en-US" smtClean="0"/>
-              <a:t>2/2/18</a:t>
+              <a:t>2/4/18</a:t>
             </a:fld>
             <a:endParaRPr lang="en-US"/>
           </a:p>
@@ -1387,7 +1388,7 @@
           <a:p>
             <a:fld id="{05A3AB3E-77AE-884C-91B8-8D717975D1C6}" type="datetimeFigureOut">
               <a:rPr lang="en-US" smtClean="0"/>
-              <a:t>2/2/18</a:t>
+              <a:t>2/4/18</a:t>
             </a:fld>
             <a:endParaRPr lang="en-US"/>
           </a:p>
@@ -1633,7 +1634,7 @@
           <a:p>
             <a:fld id="{05A3AB3E-77AE-884C-91B8-8D717975D1C6}" type="datetimeFigureOut">
               <a:rPr lang="en-US" smtClean="0"/>
-              <a:t>2/2/18</a:t>
+              <a:t>2/4/18</a:t>
             </a:fld>
             <a:endParaRPr lang="en-US"/>
           </a:p>
@@ -1865,7 +1866,7 @@
           <a:p>
             <a:fld id="{05A3AB3E-77AE-884C-91B8-8D717975D1C6}" type="datetimeFigureOut">
               <a:rPr lang="en-US" smtClean="0"/>
-              <a:t>2/2/18</a:t>
+              <a:t>2/4/18</a:t>
             </a:fld>
             <a:endParaRPr lang="en-US"/>
           </a:p>
@@ -2232,7 +2233,7 @@
           <a:p>
             <a:fld id="{05A3AB3E-77AE-884C-91B8-8D717975D1C6}" type="datetimeFigureOut">
               <a:rPr lang="en-US" smtClean="0"/>
-              <a:t>2/2/18</a:t>
+              <a:t>2/4/18</a:t>
             </a:fld>
             <a:endParaRPr lang="en-US"/>
           </a:p>
@@ -2350,7 +2351,7 @@
           <a:p>
             <a:fld id="{05A3AB3E-77AE-884C-91B8-8D717975D1C6}" type="datetimeFigureOut">
               <a:rPr lang="en-US" smtClean="0"/>
-              <a:t>2/2/18</a:t>
+              <a:t>2/4/18</a:t>
             </a:fld>
             <a:endParaRPr lang="en-US"/>
           </a:p>
@@ -2445,7 +2446,7 @@
           <a:p>
             <a:fld id="{05A3AB3E-77AE-884C-91B8-8D717975D1C6}" type="datetimeFigureOut">
               <a:rPr lang="en-US" smtClean="0"/>
-              <a:t>2/2/18</a:t>
+              <a:t>2/4/18</a:t>
             </a:fld>
             <a:endParaRPr lang="en-US"/>
           </a:p>
@@ -2722,7 +2723,7 @@
           <a:p>
             <a:fld id="{05A3AB3E-77AE-884C-91B8-8D717975D1C6}" type="datetimeFigureOut">
               <a:rPr lang="en-US" smtClean="0"/>
-              <a:t>2/2/18</a:t>
+              <a:t>2/4/18</a:t>
             </a:fld>
             <a:endParaRPr lang="en-US"/>
           </a:p>
@@ -2975,7 +2976,7 @@
           <a:p>
             <a:fld id="{05A3AB3E-77AE-884C-91B8-8D717975D1C6}" type="datetimeFigureOut">
               <a:rPr lang="en-US" smtClean="0"/>
-              <a:t>2/2/18</a:t>
+              <a:t>2/4/18</a:t>
             </a:fld>
             <a:endParaRPr lang="en-US"/>
           </a:p>
@@ -3188,7 +3189,7 @@
           <a:p>
             <a:fld id="{05A3AB3E-77AE-884C-91B8-8D717975D1C6}" type="datetimeFigureOut">
               <a:rPr lang="en-US" smtClean="0"/>
-              <a:t>2/2/18</a:t>
+              <a:t>2/4/18</a:t>
             </a:fld>
             <a:endParaRPr lang="en-US"/>
           </a:p>
@@ -6751,6 +6752,1400 @@
     <p:extLst>
       <p:ext uri="{BB962C8B-B14F-4D97-AF65-F5344CB8AC3E}">
         <p14:creationId xmlns:p14="http://schemas.microsoft.com/office/powerpoint/2010/main" val="342686362"/>
+      </p:ext>
+    </p:extLst>
+  </p:cSld>
+  <p:clrMapOvr>
+    <a:masterClrMapping/>
+  </p:clrMapOvr>
+</p:sld>
+</file>
+
+<file path=ppt/slides/slide5.xml><?xml version="1.0" encoding="utf-8"?>
+<p:sld xmlns:a="http://schemas.openxmlformats.org/drawingml/2006/main" xmlns:r="http://schemas.openxmlformats.org/officeDocument/2006/relationships" xmlns:p="http://schemas.openxmlformats.org/presentationml/2006/main">
+  <p:cSld>
+    <p:spTree>
+      <p:nvGrpSpPr>
+        <p:cNvPr id="1" name=""/>
+        <p:cNvGrpSpPr/>
+        <p:nvPr/>
+      </p:nvGrpSpPr>
+      <p:grpSpPr>
+        <a:xfrm>
+          <a:off x="0" y="0"/>
+          <a:ext cx="0" cy="0"/>
+          <a:chOff x="0" y="0"/>
+          <a:chExt cx="0" cy="0"/>
+        </a:xfrm>
+      </p:grpSpPr>
+      <p:sp>
+        <p:nvSpPr>
+          <p:cNvPr id="2" name="Title 1"/>
+          <p:cNvSpPr>
+            <a:spLocks noGrp="1"/>
+          </p:cNvSpPr>
+          <p:nvPr>
+            <p:ph type="title"/>
+          </p:nvPr>
+        </p:nvSpPr>
+        <p:spPr/>
+        <p:txBody>
+          <a:bodyPr/>
+          <a:lstStyle/>
+          <a:p>
+            <a:r>
+              <a:rPr lang="en-US" smtClean="0"/>
+              <a:t>Face Tracking</a:t>
+            </a:r>
+            <a:endParaRPr lang="en-US"/>
+          </a:p>
+        </p:txBody>
+      </p:sp>
+      <p:sp>
+        <p:nvSpPr>
+          <p:cNvPr id="4" name="Oval 3"/>
+          <p:cNvSpPr/>
+          <p:nvPr/>
+        </p:nvSpPr>
+        <p:spPr>
+          <a:xfrm>
+            <a:off x="2832449" y="2159054"/>
+            <a:ext cx="2228649" cy="3093430"/>
+          </a:xfrm>
+          <a:prstGeom prst="ellipse">
+            <a:avLst/>
+          </a:prstGeom>
+          <a:solidFill>
+            <a:schemeClr val="bg1">
+              <a:lumMod val="85000"/>
+            </a:schemeClr>
+          </a:solidFill>
+          <a:ln>
+            <a:noFill/>
+          </a:ln>
+        </p:spPr>
+        <p:style>
+          <a:lnRef idx="2">
+            <a:schemeClr val="accent1">
+              <a:shade val="50000"/>
+            </a:schemeClr>
+          </a:lnRef>
+          <a:fillRef idx="1">
+            <a:schemeClr val="accent1"/>
+          </a:fillRef>
+          <a:effectRef idx="0">
+            <a:schemeClr val="accent1"/>
+          </a:effectRef>
+          <a:fontRef idx="minor">
+            <a:schemeClr val="lt1"/>
+          </a:fontRef>
+        </p:style>
+        <p:txBody>
+          <a:bodyPr rtlCol="0" anchor="ctr"/>
+          <a:lstStyle/>
+          <a:p>
+            <a:pPr algn="ctr"/>
+            <a:endParaRPr lang="en-US"/>
+          </a:p>
+        </p:txBody>
+      </p:sp>
+      <p:cxnSp>
+        <p:nvCxnSpPr>
+          <p:cNvPr id="6" name="Straight Connector 5"/>
+          <p:cNvCxnSpPr/>
+          <p:nvPr/>
+        </p:nvCxnSpPr>
+        <p:spPr>
+          <a:xfrm>
+            <a:off x="1842655" y="3705769"/>
+            <a:ext cx="4253345" cy="0"/>
+          </a:xfrm>
+          <a:prstGeom prst="line">
+            <a:avLst/>
+          </a:prstGeom>
+          <a:ln w="25400">
+            <a:solidFill>
+              <a:schemeClr val="tx1"/>
+            </a:solidFill>
+          </a:ln>
+        </p:spPr>
+        <p:style>
+          <a:lnRef idx="1">
+            <a:schemeClr val="accent1"/>
+          </a:lnRef>
+          <a:fillRef idx="0">
+            <a:schemeClr val="accent1"/>
+          </a:fillRef>
+          <a:effectRef idx="0">
+            <a:schemeClr val="accent1"/>
+          </a:effectRef>
+          <a:fontRef idx="minor">
+            <a:schemeClr val="tx1"/>
+          </a:fontRef>
+        </p:style>
+      </p:cxnSp>
+      <p:cxnSp>
+        <p:nvCxnSpPr>
+          <p:cNvPr id="9" name="Straight Connector 8"/>
+          <p:cNvCxnSpPr/>
+          <p:nvPr/>
+        </p:nvCxnSpPr>
+        <p:spPr>
+          <a:xfrm>
+            <a:off x="3946773" y="1467293"/>
+            <a:ext cx="0" cy="4380614"/>
+          </a:xfrm>
+          <a:prstGeom prst="line">
+            <a:avLst/>
+          </a:prstGeom>
+          <a:ln w="25400">
+            <a:solidFill>
+              <a:schemeClr val="tx1"/>
+            </a:solidFill>
+          </a:ln>
+        </p:spPr>
+        <p:style>
+          <a:lnRef idx="1">
+            <a:schemeClr val="accent1"/>
+          </a:lnRef>
+          <a:fillRef idx="0">
+            <a:schemeClr val="accent1"/>
+          </a:fillRef>
+          <a:effectRef idx="0">
+            <a:schemeClr val="accent1"/>
+          </a:effectRef>
+          <a:fontRef idx="minor">
+            <a:schemeClr val="tx1"/>
+          </a:fontRef>
+        </p:style>
+      </p:cxnSp>
+      <p:sp>
+        <p:nvSpPr>
+          <p:cNvPr id="12" name="Oval 11"/>
+          <p:cNvSpPr/>
+          <p:nvPr/>
+        </p:nvSpPr>
+        <p:spPr>
+          <a:xfrm rot="19015285">
+            <a:off x="2855002" y="2110885"/>
+            <a:ext cx="2228649" cy="3093430"/>
+          </a:xfrm>
+          <a:prstGeom prst="ellipse">
+            <a:avLst/>
+          </a:prstGeom>
+          <a:noFill/>
+          <a:ln w="50800">
+            <a:solidFill>
+              <a:schemeClr val="tx1"/>
+            </a:solidFill>
+            <a:prstDash val="sysDot"/>
+          </a:ln>
+        </p:spPr>
+        <p:style>
+          <a:lnRef idx="2">
+            <a:schemeClr val="accent1">
+              <a:shade val="50000"/>
+            </a:schemeClr>
+          </a:lnRef>
+          <a:fillRef idx="1">
+            <a:schemeClr val="accent1"/>
+          </a:fillRef>
+          <a:effectRef idx="0">
+            <a:schemeClr val="accent1"/>
+          </a:effectRef>
+          <a:fontRef idx="minor">
+            <a:schemeClr val="lt1"/>
+          </a:fontRef>
+        </p:style>
+        <p:txBody>
+          <a:bodyPr rtlCol="0" anchor="ctr"/>
+          <a:lstStyle/>
+          <a:p>
+            <a:pPr algn="ctr"/>
+            <a:endParaRPr lang="en-US"/>
+          </a:p>
+        </p:txBody>
+      </p:sp>
+      <p:cxnSp>
+        <p:nvCxnSpPr>
+          <p:cNvPr id="14" name="Straight Connector 13"/>
+          <p:cNvCxnSpPr/>
+          <p:nvPr/>
+        </p:nvCxnSpPr>
+        <p:spPr>
+          <a:xfrm>
+            <a:off x="2135502" y="1820574"/>
+            <a:ext cx="3924787" cy="4027333"/>
+          </a:xfrm>
+          <a:prstGeom prst="line">
+            <a:avLst/>
+          </a:prstGeom>
+          <a:ln w="50800">
+            <a:solidFill>
+              <a:schemeClr val="tx1"/>
+            </a:solidFill>
+            <a:prstDash val="sysDot"/>
+          </a:ln>
+        </p:spPr>
+        <p:style>
+          <a:lnRef idx="1">
+            <a:schemeClr val="accent1"/>
+          </a:lnRef>
+          <a:fillRef idx="0">
+            <a:schemeClr val="accent1"/>
+          </a:fillRef>
+          <a:effectRef idx="0">
+            <a:schemeClr val="accent1"/>
+          </a:effectRef>
+          <a:fontRef idx="minor">
+            <a:schemeClr val="tx1"/>
+          </a:fontRef>
+        </p:style>
+      </p:cxnSp>
+      <mc:AlternateContent xmlns:mc="http://schemas.openxmlformats.org/markup-compatibility/2006" xmlns:a14="http://schemas.microsoft.com/office/drawing/2010/main">
+        <mc:Choice Requires="a14">
+          <p:sp>
+            <p:nvSpPr>
+              <p:cNvPr id="16" name="TextBox 15"/>
+              <p:cNvSpPr txBox="1"/>
+              <p:nvPr/>
+            </p:nvSpPr>
+            <p:spPr>
+              <a:xfrm>
+                <a:off x="3267969" y="2621850"/>
+                <a:ext cx="865637" cy="615553"/>
+              </a:xfrm>
+              <a:prstGeom prst="rect">
+                <a:avLst/>
+              </a:prstGeom>
+              <a:noFill/>
+            </p:spPr>
+            <p:txBody>
+              <a:bodyPr wrap="square" lIns="0" tIns="0" rIns="0" bIns="0" rtlCol="0">
+                <a:spAutoFit/>
+              </a:bodyPr>
+              <a:lstStyle/>
+              <a:p>
+                <a:pPr/>
+                <a14:m>
+                  <m:oMathPara xmlns:m="http://schemas.openxmlformats.org/officeDocument/2006/math">
+                    <m:oMathParaPr>
+                      <m:jc m:val="centerGroup"/>
+                    </m:oMathParaPr>
+                    <m:oMath xmlns:m="http://schemas.openxmlformats.org/officeDocument/2006/math">
+                      <m:r>
+                        <a:rPr lang="en-US" sz="4000" i="1" smtClean="0">
+                          <a:latin typeface="Cambria Math" charset="0"/>
+                          <a:ea typeface="Cambria Math" charset="0"/>
+                          <a:cs typeface="Cambria Math" charset="0"/>
+                        </a:rPr>
+                        <m:t>𝜃</m:t>
+                      </m:r>
+                    </m:oMath>
+                  </m:oMathPara>
+                </a14:m>
+                <a:endParaRPr lang="en-US" sz="4000" dirty="0"/>
+              </a:p>
+            </p:txBody>
+          </p:sp>
+        </mc:Choice>
+        <mc:Fallback xmlns="">
+          <p:sp>
+            <p:nvSpPr>
+              <p:cNvPr id="16" name="TextBox 15"/>
+              <p:cNvSpPr txBox="1">
+                <a:spLocks noRot="1" noChangeAspect="1" noMove="1" noResize="1" noEditPoints="1" noAdjustHandles="1" noChangeArrowheads="1" noChangeShapeType="1" noTextEdit="1"/>
+              </p:cNvSpPr>
+              <p:nvPr/>
+            </p:nvSpPr>
+            <p:spPr>
+              <a:xfrm>
+                <a:off x="3267969" y="2621850"/>
+                <a:ext cx="865637" cy="615553"/>
+              </a:xfrm>
+              <a:prstGeom prst="rect">
+                <a:avLst/>
+              </a:prstGeom>
+              <a:blipFill rotWithShape="0">
+                <a:blip r:embed="rId2"/>
+                <a:stretch>
+                  <a:fillRect/>
+                </a:stretch>
+              </a:blipFill>
+            </p:spPr>
+            <p:txBody>
+              <a:bodyPr/>
+              <a:lstStyle/>
+              <a:p>
+                <a:r>
+                  <a:rPr lang="en-US">
+                    <a:noFill/>
+                  </a:rPr>
+                  <a:t> </a:t>
+                </a:r>
+              </a:p>
+            </p:txBody>
+          </p:sp>
+        </mc:Fallback>
+      </mc:AlternateContent>
+      <p:sp>
+        <p:nvSpPr>
+          <p:cNvPr id="17" name="Freeform 16"/>
+          <p:cNvSpPr/>
+          <p:nvPr/>
+        </p:nvSpPr>
+        <p:spPr>
+          <a:xfrm>
+            <a:off x="3946773" y="2105247"/>
+            <a:ext cx="2836799" cy="1564337"/>
+          </a:xfrm>
+          <a:custGeom>
+            <a:avLst/>
+            <a:gdLst>
+              <a:gd name="connsiteX0" fmla="*/ 0 w 2764465"/>
+              <a:gd name="connsiteY0" fmla="*/ 1467293 h 1467293"/>
+              <a:gd name="connsiteX1" fmla="*/ 999460 w 2764465"/>
+              <a:gd name="connsiteY1" fmla="*/ 191386 h 1467293"/>
+              <a:gd name="connsiteX2" fmla="*/ 2147777 w 2764465"/>
+              <a:gd name="connsiteY2" fmla="*/ 956930 h 1467293"/>
+              <a:gd name="connsiteX3" fmla="*/ 2764465 w 2764465"/>
+              <a:gd name="connsiteY3" fmla="*/ 0 h 1467293"/>
+            </a:gdLst>
+            <a:ahLst/>
+            <a:cxnLst>
+              <a:cxn ang="0">
+                <a:pos x="connsiteX0" y="connsiteY0"/>
+              </a:cxn>
+              <a:cxn ang="0">
+                <a:pos x="connsiteX1" y="connsiteY1"/>
+              </a:cxn>
+              <a:cxn ang="0">
+                <a:pos x="connsiteX2" y="connsiteY2"/>
+              </a:cxn>
+              <a:cxn ang="0">
+                <a:pos x="connsiteX3" y="connsiteY3"/>
+              </a:cxn>
+            </a:cxnLst>
+            <a:rect l="l" t="t" r="r" b="b"/>
+            <a:pathLst>
+              <a:path w="2764465" h="1467293">
+                <a:moveTo>
+                  <a:pt x="0" y="1467293"/>
+                </a:moveTo>
+                <a:cubicBezTo>
+                  <a:pt x="320748" y="871869"/>
+                  <a:pt x="641497" y="276446"/>
+                  <a:pt x="999460" y="191386"/>
+                </a:cubicBezTo>
+                <a:cubicBezTo>
+                  <a:pt x="1357423" y="106326"/>
+                  <a:pt x="1853610" y="988828"/>
+                  <a:pt x="2147777" y="956930"/>
+                </a:cubicBezTo>
+                <a:cubicBezTo>
+                  <a:pt x="2441944" y="925032"/>
+                  <a:pt x="2764465" y="0"/>
+                  <a:pt x="2764465" y="0"/>
+                </a:cubicBezTo>
+              </a:path>
+            </a:pathLst>
+          </a:custGeom>
+          <a:noFill/>
+          <a:ln w="25400">
+            <a:solidFill>
+              <a:schemeClr val="tx1"/>
+            </a:solidFill>
+            <a:tailEnd type="triangle" w="lg" len="lg"/>
+          </a:ln>
+        </p:spPr>
+        <p:style>
+          <a:lnRef idx="2">
+            <a:schemeClr val="accent1">
+              <a:shade val="50000"/>
+            </a:schemeClr>
+          </a:lnRef>
+          <a:fillRef idx="1">
+            <a:schemeClr val="accent1"/>
+          </a:fillRef>
+          <a:effectRef idx="0">
+            <a:schemeClr val="accent1"/>
+          </a:effectRef>
+          <a:fontRef idx="minor">
+            <a:schemeClr val="lt1"/>
+          </a:fontRef>
+        </p:style>
+        <p:txBody>
+          <a:bodyPr rtlCol="0" anchor="ctr"/>
+          <a:lstStyle/>
+          <a:p>
+            <a:pPr algn="ctr"/>
+            <a:endParaRPr lang="en-US"/>
+          </a:p>
+        </p:txBody>
+      </p:sp>
+      <mc:AlternateContent xmlns:mc="http://schemas.openxmlformats.org/markup-compatibility/2006">
+        <mc:Choice xmlns:a14="http://schemas.microsoft.com/office/drawing/2010/main" Requires="a14">
+          <p:sp>
+            <p:nvSpPr>
+              <p:cNvPr id="18" name="TextBox 17"/>
+              <p:cNvSpPr txBox="1"/>
+              <p:nvPr/>
+            </p:nvSpPr>
+            <p:spPr>
+              <a:xfrm>
+                <a:off x="5619875" y="1423079"/>
+                <a:ext cx="3040911" cy="644215"/>
+              </a:xfrm>
+              <a:prstGeom prst="rect">
+                <a:avLst/>
+              </a:prstGeom>
+              <a:noFill/>
+            </p:spPr>
+            <p:txBody>
+              <a:bodyPr wrap="square" lIns="0" tIns="0" rIns="0" bIns="0" rtlCol="0">
+                <a:spAutoFit/>
+              </a:bodyPr>
+              <a:lstStyle/>
+              <a:p>
+                <a:pPr/>
+                <a14:m>
+                  <m:oMathPara xmlns:m="http://schemas.openxmlformats.org/officeDocument/2006/math">
+                    <m:oMathParaPr>
+                      <m:jc m:val="centerGroup"/>
+                    </m:oMathParaPr>
+                    <m:oMath xmlns:m="http://schemas.openxmlformats.org/officeDocument/2006/math">
+                      <m:r>
+                        <a:rPr lang="en-US" sz="4000" b="0" i="1" smtClean="0">
+                          <a:latin typeface="Cambria Math" charset="0"/>
+                        </a:rPr>
+                        <m:t>(</m:t>
+                      </m:r>
+                      <m:r>
+                        <a:rPr lang="en-US" sz="4000" b="0" i="1" smtClean="0">
+                          <a:latin typeface="Cambria Math" charset="0"/>
+                        </a:rPr>
+                        <m:t>𝑥</m:t>
+                      </m:r>
+                      <m:r>
+                        <a:rPr lang="en-US" sz="4000" b="0" i="1" smtClean="0">
+                          <a:latin typeface="Cambria Math" charset="0"/>
+                        </a:rPr>
+                        <m:t>, </m:t>
+                      </m:r>
+                      <m:r>
+                        <a:rPr lang="en-US" sz="4000" b="0" i="1" smtClean="0">
+                          <a:latin typeface="Cambria Math" charset="0"/>
+                        </a:rPr>
+                        <m:t>𝑦</m:t>
+                      </m:r>
+                      <m:r>
+                        <a:rPr lang="en-US" sz="4000" b="0" i="1" smtClean="0">
+                          <a:latin typeface="Cambria Math" charset="0"/>
+                        </a:rPr>
+                        <m:t>, </m:t>
+                      </m:r>
+                      <m:r>
+                        <a:rPr lang="en-US" sz="4000" b="0" i="1" smtClean="0">
+                          <a:latin typeface="Cambria Math" charset="0"/>
+                          <a:ea typeface="Cambria Math" charset="0"/>
+                          <a:cs typeface="Cambria Math" charset="0"/>
+                        </a:rPr>
+                        <m:t>𝜃</m:t>
+                      </m:r>
+                      <m:r>
+                        <a:rPr lang="en-US" sz="4000" b="0" i="1" smtClean="0">
+                          <a:latin typeface="Cambria Math" charset="0"/>
+                          <a:ea typeface="Cambria Math" charset="0"/>
+                          <a:cs typeface="Cambria Math" charset="0"/>
+                        </a:rPr>
+                        <m:t>,</m:t>
+                      </m:r>
+                      <m:acc>
+                        <m:accPr>
+                          <m:chr m:val="̇"/>
+                          <m:ctrlPr>
+                            <a:rPr lang="en-US" sz="4000" b="0" i="1" smtClean="0">
+                              <a:latin typeface="Cambria Math" charset="0"/>
+                              <a:ea typeface="Cambria Math" charset="0"/>
+                              <a:cs typeface="Cambria Math" charset="0"/>
+                            </a:rPr>
+                          </m:ctrlPr>
+                        </m:accPr>
+                        <m:e>
+                          <m:r>
+                            <a:rPr lang="en-US" sz="4000" b="0" i="1" smtClean="0">
+                              <a:latin typeface="Cambria Math" charset="0"/>
+                              <a:ea typeface="Cambria Math" charset="0"/>
+                              <a:cs typeface="Cambria Math" charset="0"/>
+                            </a:rPr>
+                            <m:t>𝑥</m:t>
+                          </m:r>
+                        </m:e>
+                      </m:acc>
+                      <m:r>
+                        <a:rPr lang="en-US" sz="4000" b="0" i="1" smtClean="0">
+                          <a:latin typeface="Cambria Math" charset="0"/>
+                        </a:rPr>
+                        <m:t>,</m:t>
+                      </m:r>
+                      <m:acc>
+                        <m:accPr>
+                          <m:chr m:val="̇"/>
+                          <m:ctrlPr>
+                            <a:rPr lang="en-US" sz="4000" b="0" i="1" smtClean="0">
+                              <a:latin typeface="Cambria Math" charset="0"/>
+                            </a:rPr>
+                          </m:ctrlPr>
+                        </m:accPr>
+                        <m:e>
+                          <m:r>
+                            <a:rPr lang="en-US" sz="4000" b="0" i="1" smtClean="0">
+                              <a:latin typeface="Cambria Math" charset="0"/>
+                            </a:rPr>
+                            <m:t>𝑦</m:t>
+                          </m:r>
+                        </m:e>
+                      </m:acc>
+                      <m:r>
+                        <a:rPr lang="en-US" sz="4000" b="0" i="1" smtClean="0">
+                          <a:latin typeface="Cambria Math" charset="0"/>
+                        </a:rPr>
+                        <m:t>,</m:t>
+                      </m:r>
+                      <m:acc>
+                        <m:accPr>
+                          <m:chr m:val="̇"/>
+                          <m:ctrlPr>
+                            <a:rPr lang="en-US" sz="4000" b="0" i="1" smtClean="0">
+                              <a:latin typeface="Cambria Math" charset="0"/>
+                            </a:rPr>
+                          </m:ctrlPr>
+                        </m:accPr>
+                        <m:e>
+                          <m:r>
+                            <a:rPr lang="en-US" sz="4000" b="0" i="1" smtClean="0">
+                              <a:latin typeface="Cambria Math" charset="0"/>
+                              <a:ea typeface="Cambria Math" charset="0"/>
+                              <a:cs typeface="Cambria Math" charset="0"/>
+                            </a:rPr>
+                            <m:t>𝜃</m:t>
+                          </m:r>
+                        </m:e>
+                      </m:acc>
+                      <m:r>
+                        <a:rPr lang="en-US" sz="4000" b="0" i="1" smtClean="0">
+                          <a:latin typeface="Cambria Math" charset="0"/>
+                        </a:rPr>
+                        <m:t>)</m:t>
+                      </m:r>
+                    </m:oMath>
+                  </m:oMathPara>
+                </a14:m>
+                <a:endParaRPr lang="en-US" sz="4000" dirty="0"/>
+              </a:p>
+            </p:txBody>
+          </p:sp>
+        </mc:Choice>
+        <mc:Fallback>
+          <p:sp>
+            <p:nvSpPr>
+              <p:cNvPr id="18" name="TextBox 17"/>
+              <p:cNvSpPr txBox="1">
+                <a:spLocks noRot="1" noChangeAspect="1" noMove="1" noResize="1" noEditPoints="1" noAdjustHandles="1" noChangeArrowheads="1" noChangeShapeType="1" noTextEdit="1"/>
+              </p:cNvSpPr>
+              <p:nvPr/>
+            </p:nvSpPr>
+            <p:spPr>
+              <a:xfrm>
+                <a:off x="5619875" y="1423079"/>
+                <a:ext cx="3040911" cy="644215"/>
+              </a:xfrm>
+              <a:prstGeom prst="rect">
+                <a:avLst/>
+              </a:prstGeom>
+              <a:blipFill rotWithShape="0">
+                <a:blip r:embed="rId3"/>
+                <a:stretch>
+                  <a:fillRect r="-1403"/>
+                </a:stretch>
+              </a:blipFill>
+            </p:spPr>
+            <p:txBody>
+              <a:bodyPr/>
+              <a:lstStyle/>
+              <a:p>
+                <a:r>
+                  <a:rPr lang="en-US">
+                    <a:noFill/>
+                  </a:rPr>
+                  <a:t> </a:t>
+                </a:r>
+              </a:p>
+            </p:txBody>
+          </p:sp>
+        </mc:Fallback>
+      </mc:AlternateContent>
+      <mc:AlternateContent xmlns:mc="http://schemas.openxmlformats.org/markup-compatibility/2006">
+        <mc:Choice xmlns:a14="http://schemas.microsoft.com/office/drawing/2010/main" Requires="a14">
+          <p:sp>
+            <p:nvSpPr>
+              <p:cNvPr id="3" name="TextBox 2"/>
+              <p:cNvSpPr txBox="1"/>
+              <p:nvPr/>
+            </p:nvSpPr>
+            <p:spPr>
+              <a:xfrm>
+                <a:off x="6783572" y="2159054"/>
+                <a:ext cx="5306360" cy="2279278"/>
+              </a:xfrm>
+              <a:prstGeom prst="rect">
+                <a:avLst/>
+              </a:prstGeom>
+              <a:noFill/>
+            </p:spPr>
+            <p:txBody>
+              <a:bodyPr wrap="square" lIns="0" tIns="0" rIns="0" bIns="0" rtlCol="0">
+                <a:spAutoFit/>
+              </a:bodyPr>
+              <a:lstStyle/>
+              <a:p>
+                <a:r>
+                  <a:rPr lang="en-US" sz="4000" dirty="0" smtClean="0"/>
+                  <a:t>Prediction:  </a:t>
+                </a:r>
+                <a14:m>
+                  <m:oMath xmlns:m="http://schemas.openxmlformats.org/officeDocument/2006/math">
+                    <m:d>
+                      <m:dPr>
+                        <m:begChr m:val="{"/>
+                        <m:endChr m:val=""/>
+                        <m:ctrlPr>
+                          <a:rPr lang="en-US" sz="4000" i="1" smtClean="0">
+                            <a:latin typeface="Cambria Math" charset="0"/>
+                          </a:rPr>
+                        </m:ctrlPr>
+                      </m:dPr>
+                      <m:e>
+                        <m:m>
+                          <m:mPr>
+                            <m:mcs>
+                              <m:mc>
+                                <m:mcPr>
+                                  <m:count m:val="1"/>
+                                  <m:mcJc m:val="center"/>
+                                </m:mcPr>
+                              </m:mc>
+                            </m:mcs>
+                            <m:ctrlPr>
+                              <a:rPr lang="mr-IN" sz="4000" i="1" smtClean="0">
+                                <a:latin typeface="Cambria Math" charset="0"/>
+                              </a:rPr>
+                            </m:ctrlPr>
+                          </m:mPr>
+                          <m:mr>
+                            <m:e>
+                              <m:acc>
+                                <m:accPr>
+                                  <m:chr m:val="̇"/>
+                                  <m:ctrlPr>
+                                    <a:rPr lang="mr-IN" sz="4000" i="1" smtClean="0">
+                                      <a:latin typeface="Cambria Math" charset="0"/>
+                                    </a:rPr>
+                                  </m:ctrlPr>
+                                </m:accPr>
+                                <m:e>
+                                  <m:r>
+                                    <a:rPr lang="en-US" sz="4000" b="0" i="1" smtClean="0">
+                                      <a:latin typeface="Cambria Math" charset="0"/>
+                                    </a:rPr>
+                                    <m:t>𝑥</m:t>
+                                  </m:r>
+                                </m:e>
+                              </m:acc>
+                              <m:r>
+                                <a:rPr lang="en-US" sz="4000" b="0" i="1" smtClean="0">
+                                  <a:latin typeface="Cambria Math" charset="0"/>
+                                </a:rPr>
+                                <m:t>=</m:t>
+                              </m:r>
+                              <m:sSub>
+                                <m:sSubPr>
+                                  <m:ctrlPr>
+                                    <a:rPr lang="en-US" sz="4000" b="0" i="1" smtClean="0">
+                                      <a:latin typeface="Cambria Math" charset="0"/>
+                                    </a:rPr>
+                                  </m:ctrlPr>
+                                </m:sSubPr>
+                                <m:e>
+                                  <m:r>
+                                    <a:rPr lang="en-US" sz="4000" i="1">
+                                      <a:latin typeface="Cambria Math" charset="0"/>
+                                      <a:ea typeface="Cambria Math" charset="0"/>
+                                      <a:cs typeface="Cambria Math" charset="0"/>
+                                    </a:rPr>
+                                    <m:t>𝜖</m:t>
+                                  </m:r>
+                                </m:e>
+                                <m:sub>
+                                  <m:r>
+                                    <a:rPr lang="en-US" sz="4000" b="0" i="1" smtClean="0">
+                                      <a:latin typeface="Cambria Math" charset="0"/>
+                                    </a:rPr>
+                                    <m:t>1</m:t>
+                                  </m:r>
+                                </m:sub>
+                              </m:sSub>
+                            </m:e>
+                          </m:mr>
+                          <m:mr>
+                            <m:e>
+                              <m:acc>
+                                <m:accPr>
+                                  <m:chr m:val="̇"/>
+                                  <m:ctrlPr>
+                                    <a:rPr lang="mr-IN" sz="4000" i="1" smtClean="0">
+                                      <a:latin typeface="Cambria Math" charset="0"/>
+                                    </a:rPr>
+                                  </m:ctrlPr>
+                                </m:accPr>
+                                <m:e>
+                                  <m:r>
+                                    <a:rPr lang="en-US" sz="4000" b="0" i="1" smtClean="0">
+                                      <a:latin typeface="Cambria Math" charset="0"/>
+                                    </a:rPr>
+                                    <m:t>𝑦</m:t>
+                                  </m:r>
+                                </m:e>
+                              </m:acc>
+                              <m:r>
+                                <a:rPr lang="en-US" sz="4000" b="0" i="1" smtClean="0">
+                                  <a:latin typeface="Cambria Math" charset="0"/>
+                                </a:rPr>
+                                <m:t>=</m:t>
+                              </m:r>
+                              <m:sSub>
+                                <m:sSubPr>
+                                  <m:ctrlPr>
+                                    <a:rPr lang="en-US" sz="4000" i="1">
+                                      <a:latin typeface="Cambria Math" charset="0"/>
+                                    </a:rPr>
+                                  </m:ctrlPr>
+                                </m:sSubPr>
+                                <m:e>
+                                  <m:r>
+                                    <a:rPr lang="en-US" sz="4000" i="1">
+                                      <a:latin typeface="Cambria Math" charset="0"/>
+                                      <a:ea typeface="Cambria Math" charset="0"/>
+                                      <a:cs typeface="Cambria Math" charset="0"/>
+                                    </a:rPr>
+                                    <m:t>𝜖</m:t>
+                                  </m:r>
+                                </m:e>
+                                <m:sub>
+                                  <m:r>
+                                    <a:rPr lang="en-US" sz="4000" b="0" i="1" smtClean="0">
+                                      <a:latin typeface="Cambria Math" charset="0"/>
+                                      <a:ea typeface="Cambria Math" charset="0"/>
+                                      <a:cs typeface="Cambria Math" charset="0"/>
+                                    </a:rPr>
+                                    <m:t>2</m:t>
+                                  </m:r>
+                                </m:sub>
+                              </m:sSub>
+                            </m:e>
+                          </m:mr>
+                          <m:mr>
+                            <m:e>
+                              <m:acc>
+                                <m:accPr>
+                                  <m:chr m:val="̇"/>
+                                  <m:ctrlPr>
+                                    <a:rPr lang="mr-IN" sz="4000" i="1" smtClean="0">
+                                      <a:latin typeface="Cambria Math" charset="0"/>
+                                    </a:rPr>
+                                  </m:ctrlPr>
+                                </m:accPr>
+                                <m:e>
+                                  <m:r>
+                                    <a:rPr lang="mr-IN" sz="4000" i="1" smtClean="0">
+                                      <a:latin typeface="Cambria Math" charset="0"/>
+                                      <a:ea typeface="Cambria Math" charset="0"/>
+                                      <a:cs typeface="Cambria Math" charset="0"/>
+                                    </a:rPr>
+                                    <m:t>𝜃</m:t>
+                                  </m:r>
+                                </m:e>
+                              </m:acc>
+                              <m:r>
+                                <a:rPr lang="en-US" sz="4000" b="0" i="1" smtClean="0">
+                                  <a:latin typeface="Cambria Math" charset="0"/>
+                                </a:rPr>
+                                <m:t>=</m:t>
+                              </m:r>
+                              <m:sSub>
+                                <m:sSubPr>
+                                  <m:ctrlPr>
+                                    <a:rPr lang="en-US" sz="4000" i="1">
+                                      <a:latin typeface="Cambria Math" charset="0"/>
+                                    </a:rPr>
+                                  </m:ctrlPr>
+                                </m:sSubPr>
+                                <m:e>
+                                  <m:r>
+                                    <a:rPr lang="en-US" sz="4000" i="1">
+                                      <a:latin typeface="Cambria Math" charset="0"/>
+                                      <a:ea typeface="Cambria Math" charset="0"/>
+                                      <a:cs typeface="Cambria Math" charset="0"/>
+                                    </a:rPr>
+                                    <m:t>𝜖</m:t>
+                                  </m:r>
+                                </m:e>
+                                <m:sub>
+                                  <m:r>
+                                    <a:rPr lang="en-US" sz="4000" b="0" i="1" smtClean="0">
+                                      <a:latin typeface="Cambria Math" charset="0"/>
+                                      <a:ea typeface="Cambria Math" charset="0"/>
+                                      <a:cs typeface="Cambria Math" charset="0"/>
+                                    </a:rPr>
+                                    <m:t>3</m:t>
+                                  </m:r>
+                                </m:sub>
+                              </m:sSub>
+                            </m:e>
+                          </m:mr>
+                        </m:m>
+                      </m:e>
+                    </m:d>
+                  </m:oMath>
+                </a14:m>
+                <a:endParaRPr lang="en-US" sz="4000" dirty="0"/>
+              </a:p>
+            </p:txBody>
+          </p:sp>
+        </mc:Choice>
+        <mc:Fallback>
+          <p:sp>
+            <p:nvSpPr>
+              <p:cNvPr id="3" name="TextBox 2"/>
+              <p:cNvSpPr txBox="1">
+                <a:spLocks noRot="1" noChangeAspect="1" noMove="1" noResize="1" noEditPoints="1" noAdjustHandles="1" noChangeArrowheads="1" noChangeShapeType="1" noTextEdit="1"/>
+              </p:cNvSpPr>
+              <p:nvPr/>
+            </p:nvSpPr>
+            <p:spPr>
+              <a:xfrm>
+                <a:off x="6783572" y="2159054"/>
+                <a:ext cx="5306360" cy="2279278"/>
+              </a:xfrm>
+              <a:prstGeom prst="rect">
+                <a:avLst/>
+              </a:prstGeom>
+              <a:blipFill rotWithShape="0">
+                <a:blip r:embed="rId4"/>
+                <a:stretch>
+                  <a:fillRect l="-5862"/>
+                </a:stretch>
+              </a:blipFill>
+            </p:spPr>
+            <p:txBody>
+              <a:bodyPr/>
+              <a:lstStyle/>
+              <a:p>
+                <a:r>
+                  <a:rPr lang="en-US">
+                    <a:noFill/>
+                  </a:rPr>
+                  <a:t> </a:t>
+                </a:r>
+              </a:p>
+            </p:txBody>
+          </p:sp>
+        </mc:Fallback>
+      </mc:AlternateContent>
+      <mc:AlternateContent xmlns:mc="http://schemas.openxmlformats.org/markup-compatibility/2006">
+        <mc:Choice xmlns:a14="http://schemas.microsoft.com/office/drawing/2010/main" Requires="a14">
+          <p:sp>
+            <p:nvSpPr>
+              <p:cNvPr id="5" name="TextBox 4"/>
+              <p:cNvSpPr txBox="1"/>
+              <p:nvPr/>
+            </p:nvSpPr>
+            <p:spPr>
+              <a:xfrm>
+                <a:off x="4493959" y="5684666"/>
+                <a:ext cx="7395999" cy="745460"/>
+              </a:xfrm>
+              <a:prstGeom prst="rect">
+                <a:avLst/>
+              </a:prstGeom>
+              <a:noFill/>
+            </p:spPr>
+            <p:txBody>
+              <a:bodyPr wrap="none" lIns="0" tIns="0" rIns="0" bIns="0" rtlCol="0">
+                <a:spAutoFit/>
+              </a:bodyPr>
+              <a:lstStyle/>
+              <a:p>
+                <a:r>
+                  <a:rPr lang="en-US" sz="4000" smtClean="0"/>
+                  <a:t>Correction: </a:t>
+                </a:r>
+                <a14:m>
+                  <m:oMath xmlns:m="http://schemas.openxmlformats.org/officeDocument/2006/math">
+                    <m:rad>
+                      <m:radPr>
+                        <m:degHide m:val="on"/>
+                        <m:ctrlPr>
+                          <a:rPr lang="en-US" sz="4000" i="1" smtClean="0">
+                            <a:latin typeface="Cambria Math" charset="0"/>
+                          </a:rPr>
+                        </m:ctrlPr>
+                      </m:radPr>
+                      <m:deg/>
+                      <m:e>
+                        <m:sSup>
+                          <m:sSupPr>
+                            <m:ctrlPr>
+                              <a:rPr lang="en-US" sz="4000" i="1" smtClean="0">
+                                <a:latin typeface="Cambria Math" charset="0"/>
+                              </a:rPr>
+                            </m:ctrlPr>
+                          </m:sSupPr>
+                          <m:e>
+                            <m:r>
+                              <a:rPr lang="en-US" sz="4000" i="1">
+                                <a:latin typeface="Cambria Math" charset="0"/>
+                              </a:rPr>
+                              <m:t>(</m:t>
+                            </m:r>
+                            <m:r>
+                              <a:rPr lang="en-US" sz="4000" i="1">
+                                <a:latin typeface="Cambria Math" charset="0"/>
+                                <a:ea typeface="Cambria Math" charset="0"/>
+                                <a:cs typeface="Cambria Math" charset="0"/>
+                              </a:rPr>
+                              <m:t>∆</m:t>
+                            </m:r>
+                            <m:r>
+                              <a:rPr lang="en-US" sz="4000" i="1">
+                                <a:latin typeface="Cambria Math" charset="0"/>
+                                <a:ea typeface="Cambria Math" charset="0"/>
+                                <a:cs typeface="Cambria Math" charset="0"/>
+                              </a:rPr>
+                              <m:t>𝑥</m:t>
+                            </m:r>
+                            <m:r>
+                              <a:rPr lang="en-US" sz="4000" i="1">
+                                <a:latin typeface="Cambria Math" charset="0"/>
+                              </a:rPr>
+                              <m:t>)</m:t>
+                            </m:r>
+                          </m:e>
+                          <m:sup>
+                            <m:r>
+                              <a:rPr lang="en-US" sz="4000" b="0" i="1" smtClean="0">
+                                <a:latin typeface="Cambria Math" charset="0"/>
+                              </a:rPr>
+                              <m:t>2</m:t>
+                            </m:r>
+                          </m:sup>
+                        </m:sSup>
+                        <m:r>
+                          <a:rPr lang="en-US" sz="4000" b="0" i="1" smtClean="0">
+                            <a:latin typeface="Cambria Math" charset="0"/>
+                          </a:rPr>
+                          <m:t>+</m:t>
+                        </m:r>
+                        <m:sSup>
+                          <m:sSupPr>
+                            <m:ctrlPr>
+                              <a:rPr lang="en-US" sz="4000" i="1">
+                                <a:latin typeface="Cambria Math" charset="0"/>
+                              </a:rPr>
+                            </m:ctrlPr>
+                          </m:sSupPr>
+                          <m:e>
+                            <m:r>
+                              <a:rPr lang="en-US" sz="4000" i="1">
+                                <a:latin typeface="Cambria Math" charset="0"/>
+                              </a:rPr>
+                              <m:t>(</m:t>
+                            </m:r>
+                            <m:r>
+                              <a:rPr lang="en-US" sz="4000" i="1">
+                                <a:latin typeface="Cambria Math" charset="0"/>
+                                <a:ea typeface="Cambria Math" charset="0"/>
+                                <a:cs typeface="Cambria Math" charset="0"/>
+                              </a:rPr>
+                              <m:t>∆</m:t>
+                            </m:r>
+                            <m:r>
+                              <a:rPr lang="en-US" sz="4000" b="0" i="1" smtClean="0">
+                                <a:latin typeface="Cambria Math" charset="0"/>
+                                <a:ea typeface="Cambria Math" charset="0"/>
+                                <a:cs typeface="Cambria Math" charset="0"/>
+                              </a:rPr>
+                              <m:t>𝑦</m:t>
+                            </m:r>
+                            <m:r>
+                              <a:rPr lang="en-US" sz="4000" i="1">
+                                <a:latin typeface="Cambria Math" charset="0"/>
+                              </a:rPr>
+                              <m:t>)</m:t>
+                            </m:r>
+                          </m:e>
+                          <m:sup>
+                            <m:r>
+                              <a:rPr lang="en-US" sz="4000" i="1">
+                                <a:latin typeface="Cambria Math" charset="0"/>
+                              </a:rPr>
+                              <m:t>2</m:t>
+                            </m:r>
+                          </m:sup>
+                        </m:sSup>
+                        <m:r>
+                          <a:rPr lang="en-US" sz="4000" b="0" i="1" smtClean="0">
+                            <a:latin typeface="Cambria Math" charset="0"/>
+                          </a:rPr>
+                          <m:t>+</m:t>
+                        </m:r>
+                        <m:sSup>
+                          <m:sSupPr>
+                            <m:ctrlPr>
+                              <a:rPr lang="en-US" sz="4000" i="1">
+                                <a:latin typeface="Cambria Math" charset="0"/>
+                              </a:rPr>
+                            </m:ctrlPr>
+                          </m:sSupPr>
+                          <m:e>
+                            <m:r>
+                              <a:rPr lang="en-US" sz="4000" i="1">
+                                <a:latin typeface="Cambria Math" charset="0"/>
+                              </a:rPr>
+                              <m:t>(</m:t>
+                            </m:r>
+                            <m:r>
+                              <a:rPr lang="en-US" sz="4000" i="1">
+                                <a:latin typeface="Cambria Math" charset="0"/>
+                                <a:ea typeface="Cambria Math" charset="0"/>
+                                <a:cs typeface="Cambria Math" charset="0"/>
+                              </a:rPr>
+                              <m:t>∆</m:t>
+                            </m:r>
+                            <m:r>
+                              <a:rPr lang="en-US" sz="4000" i="1" smtClean="0">
+                                <a:latin typeface="Cambria Math" charset="0"/>
+                                <a:ea typeface="Cambria Math" charset="0"/>
+                                <a:cs typeface="Cambria Math" charset="0"/>
+                              </a:rPr>
+                              <m:t>𝜃</m:t>
+                            </m:r>
+                            <m:r>
+                              <a:rPr lang="en-US" sz="4000" i="1">
+                                <a:latin typeface="Cambria Math" charset="0"/>
+                              </a:rPr>
+                              <m:t>)</m:t>
+                            </m:r>
+                          </m:e>
+                          <m:sup>
+                            <m:r>
+                              <a:rPr lang="en-US" sz="4000" i="1">
+                                <a:latin typeface="Cambria Math" charset="0"/>
+                              </a:rPr>
+                              <m:t>2</m:t>
+                            </m:r>
+                          </m:sup>
+                        </m:sSup>
+                      </m:e>
+                    </m:rad>
+                  </m:oMath>
+                </a14:m>
+                <a:endParaRPr lang="en-US" sz="4000" dirty="0"/>
+              </a:p>
+            </p:txBody>
+          </p:sp>
+        </mc:Choice>
+        <mc:Fallback>
+          <p:sp>
+            <p:nvSpPr>
+              <p:cNvPr id="5" name="TextBox 4"/>
+              <p:cNvSpPr txBox="1">
+                <a:spLocks noRot="1" noChangeAspect="1" noMove="1" noResize="1" noEditPoints="1" noAdjustHandles="1" noChangeArrowheads="1" noChangeShapeType="1" noTextEdit="1"/>
+              </p:cNvSpPr>
+              <p:nvPr/>
+            </p:nvSpPr>
+            <p:spPr>
+              <a:xfrm>
+                <a:off x="4493959" y="5684666"/>
+                <a:ext cx="7395999" cy="745460"/>
+              </a:xfrm>
+              <a:prstGeom prst="rect">
+                <a:avLst/>
+              </a:prstGeom>
+              <a:blipFill rotWithShape="0">
+                <a:blip r:embed="rId5"/>
+                <a:stretch>
+                  <a:fillRect l="-4122" t="-5738" b="-38525"/>
+                </a:stretch>
+              </a:blipFill>
+            </p:spPr>
+            <p:txBody>
+              <a:bodyPr/>
+              <a:lstStyle/>
+              <a:p>
+                <a:r>
+                  <a:rPr lang="en-US">
+                    <a:noFill/>
+                  </a:rPr>
+                  <a:t> </a:t>
+                </a:r>
+              </a:p>
+            </p:txBody>
+          </p:sp>
+        </mc:Fallback>
+      </mc:AlternateContent>
+      <p:cxnSp>
+        <p:nvCxnSpPr>
+          <p:cNvPr id="8" name="Straight Arrow Connector 7"/>
+          <p:cNvCxnSpPr/>
+          <p:nvPr/>
+        </p:nvCxnSpPr>
+        <p:spPr>
+          <a:xfrm>
+            <a:off x="651164" y="2159054"/>
+            <a:ext cx="969818" cy="0"/>
+          </a:xfrm>
+          <a:prstGeom prst="straightConnector1">
+            <a:avLst/>
+          </a:prstGeom>
+          <a:ln w="25400">
+            <a:solidFill>
+              <a:schemeClr val="tx1"/>
+            </a:solidFill>
+            <a:tailEnd type="triangle"/>
+          </a:ln>
+        </p:spPr>
+        <p:style>
+          <a:lnRef idx="1">
+            <a:schemeClr val="accent1"/>
+          </a:lnRef>
+          <a:fillRef idx="0">
+            <a:schemeClr val="accent1"/>
+          </a:fillRef>
+          <a:effectRef idx="0">
+            <a:schemeClr val="accent1"/>
+          </a:effectRef>
+          <a:fontRef idx="minor">
+            <a:schemeClr val="tx1"/>
+          </a:fontRef>
+        </p:style>
+      </p:cxnSp>
+      <p:cxnSp>
+        <p:nvCxnSpPr>
+          <p:cNvPr id="11" name="Straight Arrow Connector 10"/>
+          <p:cNvCxnSpPr/>
+          <p:nvPr/>
+        </p:nvCxnSpPr>
+        <p:spPr>
+          <a:xfrm>
+            <a:off x="665018" y="2159054"/>
+            <a:ext cx="0" cy="875091"/>
+          </a:xfrm>
+          <a:prstGeom prst="straightConnector1">
+            <a:avLst/>
+          </a:prstGeom>
+          <a:ln w="25400">
+            <a:solidFill>
+              <a:schemeClr val="tx1"/>
+            </a:solidFill>
+            <a:tailEnd type="triangle"/>
+          </a:ln>
+        </p:spPr>
+        <p:style>
+          <a:lnRef idx="1">
+            <a:schemeClr val="accent1"/>
+          </a:lnRef>
+          <a:fillRef idx="0">
+            <a:schemeClr val="accent1"/>
+          </a:fillRef>
+          <a:effectRef idx="0">
+            <a:schemeClr val="accent1"/>
+          </a:effectRef>
+          <a:fontRef idx="minor">
+            <a:schemeClr val="tx1"/>
+          </a:fontRef>
+        </p:style>
+      </p:cxnSp>
+      <mc:AlternateContent xmlns:mc="http://schemas.openxmlformats.org/markup-compatibility/2006">
+        <mc:Choice xmlns:a14="http://schemas.microsoft.com/office/drawing/2010/main" Requires="a14">
+          <p:sp>
+            <p:nvSpPr>
+              <p:cNvPr id="13" name="TextBox 12"/>
+              <p:cNvSpPr txBox="1"/>
+              <p:nvPr/>
+            </p:nvSpPr>
+            <p:spPr>
+              <a:xfrm>
+                <a:off x="1196197" y="2147618"/>
+                <a:ext cx="702383" cy="615553"/>
+              </a:xfrm>
+              <a:prstGeom prst="rect">
+                <a:avLst/>
+              </a:prstGeom>
+              <a:noFill/>
+            </p:spPr>
+            <p:txBody>
+              <a:bodyPr wrap="square" lIns="0" tIns="0" rIns="0" bIns="0" rtlCol="0">
+                <a:spAutoFit/>
+              </a:bodyPr>
+              <a:lstStyle/>
+              <a:p>
+                <a14:m>
+                  <m:oMathPara xmlns:m="http://schemas.openxmlformats.org/officeDocument/2006/math">
+                    <m:oMathParaPr>
+                      <m:jc m:val="centerGroup"/>
+                    </m:oMathParaPr>
+                    <m:oMath xmlns:m="http://schemas.openxmlformats.org/officeDocument/2006/math">
+                      <m:r>
+                        <a:rPr lang="en-US" sz="4000" b="0" i="1" smtClean="0">
+                          <a:latin typeface="Cambria Math" charset="0"/>
+                        </a:rPr>
+                        <m:t>𝑥</m:t>
+                      </m:r>
+                    </m:oMath>
+                  </m:oMathPara>
+                </a14:m>
+                <a:endParaRPr lang="en-US" sz="4000" dirty="0"/>
+              </a:p>
+            </p:txBody>
+          </p:sp>
+        </mc:Choice>
+        <mc:Fallback>
+          <p:sp>
+            <p:nvSpPr>
+              <p:cNvPr id="13" name="TextBox 12"/>
+              <p:cNvSpPr txBox="1">
+                <a:spLocks noRot="1" noChangeAspect="1" noMove="1" noResize="1" noEditPoints="1" noAdjustHandles="1" noChangeArrowheads="1" noChangeShapeType="1" noTextEdit="1"/>
+              </p:cNvSpPr>
+              <p:nvPr/>
+            </p:nvSpPr>
+            <p:spPr>
+              <a:xfrm>
+                <a:off x="1196197" y="2147618"/>
+                <a:ext cx="702383" cy="615553"/>
+              </a:xfrm>
+              <a:prstGeom prst="rect">
+                <a:avLst/>
+              </a:prstGeom>
+              <a:blipFill rotWithShape="0">
+                <a:blip r:embed="rId6"/>
+                <a:stretch>
+                  <a:fillRect/>
+                </a:stretch>
+              </a:blipFill>
+            </p:spPr>
+            <p:txBody>
+              <a:bodyPr/>
+              <a:lstStyle/>
+              <a:p>
+                <a:r>
+                  <a:rPr lang="en-US">
+                    <a:noFill/>
+                  </a:rPr>
+                  <a:t> </a:t>
+                </a:r>
+              </a:p>
+            </p:txBody>
+          </p:sp>
+        </mc:Fallback>
+      </mc:AlternateContent>
+      <mc:AlternateContent xmlns:mc="http://schemas.openxmlformats.org/markup-compatibility/2006">
+        <mc:Choice xmlns:a14="http://schemas.microsoft.com/office/drawing/2010/main" Requires="a14">
+          <p:sp>
+            <p:nvSpPr>
+              <p:cNvPr id="19" name="TextBox 18"/>
+              <p:cNvSpPr txBox="1"/>
+              <p:nvPr/>
+            </p:nvSpPr>
+            <p:spPr>
+              <a:xfrm>
+                <a:off x="282289" y="2990916"/>
+                <a:ext cx="702383" cy="615553"/>
+              </a:xfrm>
+              <a:prstGeom prst="rect">
+                <a:avLst/>
+              </a:prstGeom>
+              <a:noFill/>
+            </p:spPr>
+            <p:txBody>
+              <a:bodyPr wrap="square" lIns="0" tIns="0" rIns="0" bIns="0" rtlCol="0">
+                <a:spAutoFit/>
+              </a:bodyPr>
+              <a:lstStyle/>
+              <a:p>
+                <a14:m>
+                  <m:oMathPara xmlns:m="http://schemas.openxmlformats.org/officeDocument/2006/math">
+                    <m:oMathParaPr>
+                      <m:jc m:val="centerGroup"/>
+                    </m:oMathParaPr>
+                    <m:oMath xmlns:m="http://schemas.openxmlformats.org/officeDocument/2006/math">
+                      <m:r>
+                        <a:rPr lang="en-US" sz="4000" b="0" i="1" smtClean="0">
+                          <a:latin typeface="Cambria Math" charset="0"/>
+                        </a:rPr>
+                        <m:t>𝑦</m:t>
+                      </m:r>
+                    </m:oMath>
+                  </m:oMathPara>
+                </a14:m>
+                <a:endParaRPr lang="en-US" sz="4000" dirty="0"/>
+              </a:p>
+            </p:txBody>
+          </p:sp>
+        </mc:Choice>
+        <mc:Fallback>
+          <p:sp>
+            <p:nvSpPr>
+              <p:cNvPr id="19" name="TextBox 18"/>
+              <p:cNvSpPr txBox="1">
+                <a:spLocks noRot="1" noChangeAspect="1" noMove="1" noResize="1" noEditPoints="1" noAdjustHandles="1" noChangeArrowheads="1" noChangeShapeType="1" noTextEdit="1"/>
+              </p:cNvSpPr>
+              <p:nvPr/>
+            </p:nvSpPr>
+            <p:spPr>
+              <a:xfrm>
+                <a:off x="282289" y="2990916"/>
+                <a:ext cx="702383" cy="615553"/>
+              </a:xfrm>
+              <a:prstGeom prst="rect">
+                <a:avLst/>
+              </a:prstGeom>
+              <a:blipFill rotWithShape="0">
+                <a:blip r:embed="rId7"/>
+                <a:stretch>
+                  <a:fillRect/>
+                </a:stretch>
+              </a:blipFill>
+            </p:spPr>
+            <p:txBody>
+              <a:bodyPr/>
+              <a:lstStyle/>
+              <a:p>
+                <a:r>
+                  <a:rPr lang="en-US">
+                    <a:noFill/>
+                  </a:rPr>
+                  <a:t> </a:t>
+                </a:r>
+              </a:p>
+            </p:txBody>
+          </p:sp>
+        </mc:Fallback>
+      </mc:AlternateContent>
+    </p:spTree>
+    <p:extLst>
+      <p:ext uri="{BB962C8B-B14F-4D97-AF65-F5344CB8AC3E}">
+        <p14:creationId xmlns:p14="http://schemas.microsoft.com/office/powerpoint/2010/main" val="410079988"/>
       </p:ext>
     </p:extLst>
   </p:cSld>

</xml_diff>